<commit_message>
updated EPBT based on Fhetenakis 2021
</commit_message>
<xml_diff>
--- a/Figures/Chapter_01/drawings/Fig1.2_radiation_map.pptx
+++ b/Figures/Chapter_01/drawings/Fig1.2_radiation_map.pptx
@@ -261,7 +261,7 @@
           <a:p>
             <a:fld id="{A43F5C92-9D54-42E7-9213-216165AB5EEF}" type="datetimeFigureOut">
               <a:rPr lang="en-GB" smtClean="0"/>
-              <a:t>09/11/2021</a:t>
+              <a:t>29/03/2022</a:t>
             </a:fld>
             <a:endParaRPr lang="en-GB"/>
           </a:p>
@@ -461,7 +461,7 @@
           <a:p>
             <a:fld id="{A43F5C92-9D54-42E7-9213-216165AB5EEF}" type="datetimeFigureOut">
               <a:rPr lang="en-GB" smtClean="0"/>
-              <a:t>09/11/2021</a:t>
+              <a:t>29/03/2022</a:t>
             </a:fld>
             <a:endParaRPr lang="en-GB"/>
           </a:p>
@@ -671,7 +671,7 @@
           <a:p>
             <a:fld id="{A43F5C92-9D54-42E7-9213-216165AB5EEF}" type="datetimeFigureOut">
               <a:rPr lang="en-GB" smtClean="0"/>
-              <a:t>09/11/2021</a:t>
+              <a:t>29/03/2022</a:t>
             </a:fld>
             <a:endParaRPr lang="en-GB"/>
           </a:p>
@@ -871,7 +871,7 @@
           <a:p>
             <a:fld id="{A43F5C92-9D54-42E7-9213-216165AB5EEF}" type="datetimeFigureOut">
               <a:rPr lang="en-GB" smtClean="0"/>
-              <a:t>09/11/2021</a:t>
+              <a:t>29/03/2022</a:t>
             </a:fld>
             <a:endParaRPr lang="en-GB"/>
           </a:p>
@@ -1147,7 +1147,7 @@
           <a:p>
             <a:fld id="{A43F5C92-9D54-42E7-9213-216165AB5EEF}" type="datetimeFigureOut">
               <a:rPr lang="en-GB" smtClean="0"/>
-              <a:t>09/11/2021</a:t>
+              <a:t>29/03/2022</a:t>
             </a:fld>
             <a:endParaRPr lang="en-GB"/>
           </a:p>
@@ -1415,7 +1415,7 @@
           <a:p>
             <a:fld id="{A43F5C92-9D54-42E7-9213-216165AB5EEF}" type="datetimeFigureOut">
               <a:rPr lang="en-GB" smtClean="0"/>
-              <a:t>09/11/2021</a:t>
+              <a:t>29/03/2022</a:t>
             </a:fld>
             <a:endParaRPr lang="en-GB"/>
           </a:p>
@@ -1830,7 +1830,7 @@
           <a:p>
             <a:fld id="{A43F5C92-9D54-42E7-9213-216165AB5EEF}" type="datetimeFigureOut">
               <a:rPr lang="en-GB" smtClean="0"/>
-              <a:t>09/11/2021</a:t>
+              <a:t>29/03/2022</a:t>
             </a:fld>
             <a:endParaRPr lang="en-GB"/>
           </a:p>
@@ -1972,7 +1972,7 @@
           <a:p>
             <a:fld id="{A43F5C92-9D54-42E7-9213-216165AB5EEF}" type="datetimeFigureOut">
               <a:rPr lang="en-GB" smtClean="0"/>
-              <a:t>09/11/2021</a:t>
+              <a:t>29/03/2022</a:t>
             </a:fld>
             <a:endParaRPr lang="en-GB"/>
           </a:p>
@@ -2085,7 +2085,7 @@
           <a:p>
             <a:fld id="{A43F5C92-9D54-42E7-9213-216165AB5EEF}" type="datetimeFigureOut">
               <a:rPr lang="en-GB" smtClean="0"/>
-              <a:t>09/11/2021</a:t>
+              <a:t>29/03/2022</a:t>
             </a:fld>
             <a:endParaRPr lang="en-GB"/>
           </a:p>
@@ -2398,7 +2398,7 @@
           <a:p>
             <a:fld id="{A43F5C92-9D54-42E7-9213-216165AB5EEF}" type="datetimeFigureOut">
               <a:rPr lang="en-GB" smtClean="0"/>
-              <a:t>09/11/2021</a:t>
+              <a:t>29/03/2022</a:t>
             </a:fld>
             <a:endParaRPr lang="en-GB"/>
           </a:p>
@@ -2687,7 +2687,7 @@
           <a:p>
             <a:fld id="{A43F5C92-9D54-42E7-9213-216165AB5EEF}" type="datetimeFigureOut">
               <a:rPr lang="en-GB" smtClean="0"/>
-              <a:t>09/11/2021</a:t>
+              <a:t>29/03/2022</a:t>
             </a:fld>
             <a:endParaRPr lang="en-GB"/>
           </a:p>
@@ -2930,7 +2930,7 @@
           <a:p>
             <a:fld id="{A43F5C92-9D54-42E7-9213-216165AB5EEF}" type="datetimeFigureOut">
               <a:rPr lang="en-GB" smtClean="0"/>
-              <a:t>09/11/2021</a:t>
+              <a:t>29/03/2022</a:t>
             </a:fld>
             <a:endParaRPr lang="en-GB"/>
           </a:p>
@@ -3470,10 +3470,10 @@
         </p:nvGrpSpPr>
         <p:grpSpPr>
           <a:xfrm>
-            <a:off x="2706648" y="3890289"/>
-            <a:ext cx="8279132" cy="876164"/>
+            <a:off x="2706648" y="3894378"/>
+            <a:ext cx="8033599" cy="876164"/>
             <a:chOff x="2392260" y="4367044"/>
-            <a:chExt cx="8279132" cy="876164"/>
+            <a:chExt cx="8033599" cy="876164"/>
           </a:xfrm>
         </p:grpSpPr>
         <p:sp>
@@ -3490,8 +3490,45 @@
           </p:nvSpPr>
           <p:spPr>
             <a:xfrm>
-              <a:off x="9224567" y="4897878"/>
+              <a:off x="8979034" y="4897878"/>
               <a:ext cx="1446825" cy="338554"/>
+            </a:xfrm>
+            <a:prstGeom prst="rect">
+              <a:avLst/>
+            </a:prstGeom>
+            <a:noFill/>
+          </p:spPr>
+          <p:txBody>
+            <a:bodyPr wrap="square" rtlCol="0">
+              <a:spAutoFit/>
+            </a:bodyPr>
+            <a:lstStyle/>
+            <a:p>
+              <a:r>
+                <a:rPr lang="en-GB" sz="1600" b="1" dirty="0">
+                  <a:latin typeface="Calibri  "/>
+                </a:rPr>
+                <a:t>6 months</a:t>
+              </a:r>
+            </a:p>
+          </p:txBody>
+        </p:sp>
+        <p:sp>
+          <p:nvSpPr>
+            <p:cNvPr id="7" name="TextBox 6">
+              <a:extLst>
+                <a:ext uri="{FF2B5EF4-FFF2-40B4-BE49-F238E27FC236}">
+                  <a16:creationId xmlns:a16="http://schemas.microsoft.com/office/drawing/2014/main" id="{DE7DE1AB-7647-43B4-9C19-C6AD1D08B70E}"/>
+                </a:ext>
+              </a:extLst>
+            </p:cNvPr>
+            <p:cNvSpPr txBox="1"/>
+            <p:nvPr/>
+          </p:nvSpPr>
+          <p:spPr>
+            <a:xfrm>
+              <a:off x="6930901" y="4897878"/>
+              <a:ext cx="1146986" cy="338554"/>
             </a:xfrm>
             <a:prstGeom prst="rect">
               <a:avLst/>
@@ -3515,10 +3552,10 @@
         </p:sp>
         <p:sp>
           <p:nvSpPr>
-            <p:cNvPr id="7" name="TextBox 6">
+            <p:cNvPr id="10" name="TextBox 9">
               <a:extLst>
                 <a:ext uri="{FF2B5EF4-FFF2-40B4-BE49-F238E27FC236}">
-                  <a16:creationId xmlns:a16="http://schemas.microsoft.com/office/drawing/2014/main" id="{DE7DE1AB-7647-43B4-9C19-C6AD1D08B70E}"/>
+                  <a16:creationId xmlns:a16="http://schemas.microsoft.com/office/drawing/2014/main" id="{7592A891-1A0F-48CC-B13B-87FA31010E40}"/>
                 </a:ext>
               </a:extLst>
             </p:cNvPr>
@@ -3527,8 +3564,8 @@
           </p:nvSpPr>
           <p:spPr>
             <a:xfrm>
-              <a:off x="7576317" y="4900020"/>
-              <a:ext cx="800081" cy="338554"/>
+              <a:off x="5764824" y="4897878"/>
+              <a:ext cx="1029655" cy="338554"/>
             </a:xfrm>
             <a:prstGeom prst="rect">
               <a:avLst/>
@@ -3552,10 +3589,10 @@
         </p:sp>
         <p:sp>
           <p:nvSpPr>
-            <p:cNvPr id="10" name="TextBox 9">
+            <p:cNvPr id="13" name="TextBox 12">
               <a:extLst>
                 <a:ext uri="{FF2B5EF4-FFF2-40B4-BE49-F238E27FC236}">
-                  <a16:creationId xmlns:a16="http://schemas.microsoft.com/office/drawing/2014/main" id="{7592A891-1A0F-48CC-B13B-87FA31010E40}"/>
+                  <a16:creationId xmlns:a16="http://schemas.microsoft.com/office/drawing/2014/main" id="{5F3F68F9-FC3B-4560-9615-4BD5E2FDB94E}"/>
                 </a:ext>
               </a:extLst>
             </p:cNvPr>
@@ -3564,8 +3601,8 @@
           </p:nvSpPr>
           <p:spPr>
             <a:xfrm>
-              <a:off x="4770975" y="4897878"/>
-              <a:ext cx="1029655" cy="338554"/>
+              <a:off x="3586091" y="4904654"/>
+              <a:ext cx="947312" cy="338554"/>
             </a:xfrm>
             <a:prstGeom prst="rect">
               <a:avLst/>
@@ -3582,44 +3619,7 @@
                 <a:rPr lang="en-GB" sz="1600" b="1" dirty="0">
                   <a:latin typeface="Calibri  "/>
                 </a:rPr>
-                <a:t>1.5 year</a:t>
-              </a:r>
-            </a:p>
-          </p:txBody>
-        </p:sp>
-        <p:sp>
-          <p:nvSpPr>
-            <p:cNvPr id="13" name="TextBox 12">
-              <a:extLst>
-                <a:ext uri="{FF2B5EF4-FFF2-40B4-BE49-F238E27FC236}">
-                  <a16:creationId xmlns:a16="http://schemas.microsoft.com/office/drawing/2014/main" id="{5F3F68F9-FC3B-4560-9615-4BD5E2FDB94E}"/>
-                </a:ext>
-              </a:extLst>
-            </p:cNvPr>
-            <p:cNvSpPr txBox="1"/>
-            <p:nvPr/>
-          </p:nvSpPr>
-          <p:spPr>
-            <a:xfrm>
-              <a:off x="3586091" y="4904654"/>
-              <a:ext cx="800097" cy="338554"/>
-            </a:xfrm>
-            <a:prstGeom prst="rect">
-              <a:avLst/>
-            </a:prstGeom>
-            <a:noFill/>
-          </p:spPr>
-          <p:txBody>
-            <a:bodyPr wrap="square" rtlCol="0">
-              <a:spAutoFit/>
-            </a:bodyPr>
-            <a:lstStyle/>
-            <a:p>
-              <a:r>
-                <a:rPr lang="en-GB" sz="1600" b="1" dirty="0">
-                  <a:latin typeface="Calibri  "/>
-                </a:rPr>
-                <a:t>2 years</a:t>
+                <a:t>1.5 years</a:t>
               </a:r>
             </a:p>
           </p:txBody>
@@ -3751,7 +3751,7 @@
           </p:nvCxnSpPr>
           <p:spPr>
             <a:xfrm>
-              <a:off x="5167017" y="4858475"/>
+              <a:off x="6102907" y="4860583"/>
               <a:ext cx="0" cy="108000"/>
             </a:xfrm>
             <a:prstGeom prst="line">
@@ -3792,7 +3792,7 @@
           </p:nvCxnSpPr>
           <p:spPr>
             <a:xfrm>
-              <a:off x="7937681" y="4860583"/>
+              <a:off x="7323533" y="4860583"/>
               <a:ext cx="0" cy="108000"/>
             </a:xfrm>
             <a:prstGeom prst="line">
@@ -3833,7 +3833,7 @@
           </p:nvCxnSpPr>
           <p:spPr>
             <a:xfrm>
-              <a:off x="9615195" y="4866561"/>
+              <a:off x="9445856" y="4862328"/>
               <a:ext cx="0" cy="108000"/>
             </a:xfrm>
             <a:prstGeom prst="line">

</xml_diff>

<commit_message>
Add Arial as font and  yaml with default color scheme
</commit_message>
<xml_diff>
--- a/Figures/Chapter_01/drawings/Fig1.2_radiation_map.pptx
+++ b/Figures/Chapter_01/drawings/Fig1.2_radiation_map.pptx
@@ -261,7 +261,7 @@
           <a:p>
             <a:fld id="{A43F5C92-9D54-42E7-9213-216165AB5EEF}" type="datetimeFigureOut">
               <a:rPr lang="en-GB" smtClean="0"/>
-              <a:t>29/03/2022</a:t>
+              <a:t>13/07/2022</a:t>
             </a:fld>
             <a:endParaRPr lang="en-GB"/>
           </a:p>
@@ -461,7 +461,7 @@
           <a:p>
             <a:fld id="{A43F5C92-9D54-42E7-9213-216165AB5EEF}" type="datetimeFigureOut">
               <a:rPr lang="en-GB" smtClean="0"/>
-              <a:t>29/03/2022</a:t>
+              <a:t>13/07/2022</a:t>
             </a:fld>
             <a:endParaRPr lang="en-GB"/>
           </a:p>
@@ -671,7 +671,7 @@
           <a:p>
             <a:fld id="{A43F5C92-9D54-42E7-9213-216165AB5EEF}" type="datetimeFigureOut">
               <a:rPr lang="en-GB" smtClean="0"/>
-              <a:t>29/03/2022</a:t>
+              <a:t>13/07/2022</a:t>
             </a:fld>
             <a:endParaRPr lang="en-GB"/>
           </a:p>
@@ -871,7 +871,7 @@
           <a:p>
             <a:fld id="{A43F5C92-9D54-42E7-9213-216165AB5EEF}" type="datetimeFigureOut">
               <a:rPr lang="en-GB" smtClean="0"/>
-              <a:t>29/03/2022</a:t>
+              <a:t>13/07/2022</a:t>
             </a:fld>
             <a:endParaRPr lang="en-GB"/>
           </a:p>
@@ -1147,7 +1147,7 @@
           <a:p>
             <a:fld id="{A43F5C92-9D54-42E7-9213-216165AB5EEF}" type="datetimeFigureOut">
               <a:rPr lang="en-GB" smtClean="0"/>
-              <a:t>29/03/2022</a:t>
+              <a:t>13/07/2022</a:t>
             </a:fld>
             <a:endParaRPr lang="en-GB"/>
           </a:p>
@@ -1415,7 +1415,7 @@
           <a:p>
             <a:fld id="{A43F5C92-9D54-42E7-9213-216165AB5EEF}" type="datetimeFigureOut">
               <a:rPr lang="en-GB" smtClean="0"/>
-              <a:t>29/03/2022</a:t>
+              <a:t>13/07/2022</a:t>
             </a:fld>
             <a:endParaRPr lang="en-GB"/>
           </a:p>
@@ -1830,7 +1830,7 @@
           <a:p>
             <a:fld id="{A43F5C92-9D54-42E7-9213-216165AB5EEF}" type="datetimeFigureOut">
               <a:rPr lang="en-GB" smtClean="0"/>
-              <a:t>29/03/2022</a:t>
+              <a:t>13/07/2022</a:t>
             </a:fld>
             <a:endParaRPr lang="en-GB"/>
           </a:p>
@@ -1972,7 +1972,7 @@
           <a:p>
             <a:fld id="{A43F5C92-9D54-42E7-9213-216165AB5EEF}" type="datetimeFigureOut">
               <a:rPr lang="en-GB" smtClean="0"/>
-              <a:t>29/03/2022</a:t>
+              <a:t>13/07/2022</a:t>
             </a:fld>
             <a:endParaRPr lang="en-GB"/>
           </a:p>
@@ -2085,7 +2085,7 @@
           <a:p>
             <a:fld id="{A43F5C92-9D54-42E7-9213-216165AB5EEF}" type="datetimeFigureOut">
               <a:rPr lang="en-GB" smtClean="0"/>
-              <a:t>29/03/2022</a:t>
+              <a:t>13/07/2022</a:t>
             </a:fld>
             <a:endParaRPr lang="en-GB"/>
           </a:p>
@@ -2398,7 +2398,7 @@
           <a:p>
             <a:fld id="{A43F5C92-9D54-42E7-9213-216165AB5EEF}" type="datetimeFigureOut">
               <a:rPr lang="en-GB" smtClean="0"/>
-              <a:t>29/03/2022</a:t>
+              <a:t>13/07/2022</a:t>
             </a:fld>
             <a:endParaRPr lang="en-GB"/>
           </a:p>
@@ -2687,7 +2687,7 @@
           <a:p>
             <a:fld id="{A43F5C92-9D54-42E7-9213-216165AB5EEF}" type="datetimeFigureOut">
               <a:rPr lang="en-GB" smtClean="0"/>
-              <a:t>29/03/2022</a:t>
+              <a:t>13/07/2022</a:t>
             </a:fld>
             <a:endParaRPr lang="en-GB"/>
           </a:p>
@@ -2930,7 +2930,7 @@
           <a:p>
             <a:fld id="{A43F5C92-9D54-42E7-9213-216165AB5EEF}" type="datetimeFigureOut">
               <a:rPr lang="en-GB" smtClean="0"/>
-              <a:t>29/03/2022</a:t>
+              <a:t>13/07/2022</a:t>
             </a:fld>
             <a:endParaRPr lang="en-GB"/>
           </a:p>
@@ -3396,8 +3396,8 @@
         </p:nvSpPr>
         <p:spPr>
           <a:xfrm>
-            <a:off x="205237" y="4378376"/>
-            <a:ext cx="3002743" cy="338554"/>
+            <a:off x="213751" y="4405965"/>
+            <a:ext cx="3002743" cy="307777"/>
           </a:xfrm>
           <a:prstGeom prst="rect">
             <a:avLst/>
@@ -3411,8 +3411,9 @@
           <a:lstStyle/>
           <a:p>
             <a:r>
-              <a:rPr lang="en-GB" sz="1600" b="1" dirty="0">
-                <a:latin typeface="Calibri  "/>
+              <a:rPr lang="en-GB" sz="1400" dirty="0">
+                <a:latin typeface="Arial" panose="020B0604020202020204" pitchFamily="34" charset="0"/>
+                <a:cs typeface="Arial" panose="020B0604020202020204" pitchFamily="34" charset="0"/>
               </a:rPr>
               <a:t>Energy payback time (EPBT):</a:t>
             </a:r>
@@ -3433,8 +3434,8 @@
         </p:nvSpPr>
         <p:spPr>
           <a:xfrm>
-            <a:off x="205237" y="3894378"/>
-            <a:ext cx="2713326" cy="338554"/>
+            <a:off x="213751" y="3918162"/>
+            <a:ext cx="2713326" cy="307777"/>
           </a:xfrm>
           <a:prstGeom prst="rect">
             <a:avLst/>
@@ -3448,8 +3449,9 @@
           <a:lstStyle/>
           <a:p>
             <a:r>
-              <a:rPr lang="en-GB" sz="1600" b="1" dirty="0">
-                <a:cs typeface="EucrosiaUPC" panose="020B0502040204020203" pitchFamily="18" charset="-34"/>
+              <a:rPr lang="en-GB" sz="1400" dirty="0">
+                <a:latin typeface="Arial" panose="020B0604020202020204" pitchFamily="34" charset="0"/>
+                <a:cs typeface="Arial" panose="020B0604020202020204" pitchFamily="34" charset="0"/>
               </a:rPr>
               <a:t>Equivalent hours (kWh/kW):</a:t>
             </a:r>
@@ -3471,9 +3473,9 @@
         <p:grpSpPr>
           <a:xfrm>
             <a:off x="2706648" y="3894378"/>
-            <a:ext cx="8033599" cy="876164"/>
+            <a:ext cx="8978421" cy="845387"/>
             <a:chOff x="2392260" y="4367044"/>
-            <a:chExt cx="8033599" cy="876164"/>
+            <a:chExt cx="8978421" cy="845387"/>
           </a:xfrm>
         </p:grpSpPr>
         <p:sp>
@@ -3491,7 +3493,7 @@
           <p:spPr>
             <a:xfrm>
               <a:off x="8979034" y="4897878"/>
-              <a:ext cx="1446825" cy="338554"/>
+              <a:ext cx="1446825" cy="307777"/>
             </a:xfrm>
             <a:prstGeom prst="rect">
               <a:avLst/>
@@ -3505,8 +3507,9 @@
             <a:lstStyle/>
             <a:p>
               <a:r>
-                <a:rPr lang="en-GB" sz="1600" b="1" dirty="0">
-                  <a:latin typeface="Calibri  "/>
+                <a:rPr lang="en-GB" sz="1400" dirty="0">
+                  <a:latin typeface="Arial" panose="020B0604020202020204" pitchFamily="34" charset="0"/>
+                  <a:cs typeface="Arial" panose="020B0604020202020204" pitchFamily="34" charset="0"/>
                 </a:rPr>
                 <a:t>6 months</a:t>
               </a:r>
@@ -3528,7 +3531,7 @@
           <p:spPr>
             <a:xfrm>
               <a:off x="6930901" y="4897878"/>
-              <a:ext cx="1146986" cy="338554"/>
+              <a:ext cx="1146986" cy="307777"/>
             </a:xfrm>
             <a:prstGeom prst="rect">
               <a:avLst/>
@@ -3542,8 +3545,9 @@
             <a:lstStyle/>
             <a:p>
               <a:r>
-                <a:rPr lang="en-GB" sz="1600" b="1" dirty="0">
-                  <a:latin typeface="Calibri  "/>
+                <a:rPr lang="en-GB" sz="1400" dirty="0">
+                  <a:latin typeface="Arial" panose="020B0604020202020204" pitchFamily="34" charset="0"/>
+                  <a:cs typeface="Arial" panose="020B0604020202020204" pitchFamily="34" charset="0"/>
                 </a:rPr>
                 <a:t>10 months</a:t>
               </a:r>
@@ -3565,7 +3569,7 @@
           <p:spPr>
             <a:xfrm>
               <a:off x="5764824" y="4897878"/>
-              <a:ext cx="1029655" cy="338554"/>
+              <a:ext cx="1029655" cy="307777"/>
             </a:xfrm>
             <a:prstGeom prst="rect">
               <a:avLst/>
@@ -3579,8 +3583,9 @@
             <a:lstStyle/>
             <a:p>
               <a:r>
-                <a:rPr lang="en-GB" sz="1600" b="1" dirty="0">
-                  <a:latin typeface="Calibri  "/>
+                <a:rPr lang="en-GB" sz="1400" dirty="0">
+                  <a:latin typeface="Arial" panose="020B0604020202020204" pitchFamily="34" charset="0"/>
+                  <a:cs typeface="Arial" panose="020B0604020202020204" pitchFamily="34" charset="0"/>
                 </a:rPr>
                 <a:t>1 year</a:t>
               </a:r>
@@ -3602,7 +3607,7 @@
           <p:spPr>
             <a:xfrm>
               <a:off x="3586091" y="4904654"/>
-              <a:ext cx="947312" cy="338554"/>
+              <a:ext cx="1424380" cy="307777"/>
             </a:xfrm>
             <a:prstGeom prst="rect">
               <a:avLst/>
@@ -3616,8 +3621,9 @@
             <a:lstStyle/>
             <a:p>
               <a:r>
-                <a:rPr lang="en-GB" sz="1600" b="1" dirty="0">
-                  <a:latin typeface="Calibri  "/>
+                <a:rPr lang="en-GB" sz="1400" dirty="0">
+                  <a:latin typeface="Arial" panose="020B0604020202020204" pitchFamily="34" charset="0"/>
+                  <a:cs typeface="Arial" panose="020B0604020202020204" pitchFamily="34" charset="0"/>
                 </a:rPr>
                 <a:t>1.5 years</a:t>
               </a:r>
@@ -3674,7 +3680,7 @@
           <p:spPr>
             <a:xfrm>
               <a:off x="2490631" y="4367044"/>
-              <a:ext cx="7542601" cy="338554"/>
+              <a:ext cx="8880050" cy="307777"/>
             </a:xfrm>
             <a:prstGeom prst="rect">
               <a:avLst/>
@@ -3688,8 +3694,9 @@
             <a:lstStyle/>
             <a:p>
               <a:r>
-                <a:rPr lang="en-GB" sz="1600" b="1" dirty="0">
-                  <a:latin typeface="Calibri  "/>
+                <a:rPr lang="en-GB" sz="1400" dirty="0">
+                  <a:latin typeface="Arial" panose="020B0604020202020204" pitchFamily="34" charset="0"/>
+                  <a:cs typeface="Arial" panose="020B0604020202020204" pitchFamily="34" charset="0"/>
                 </a:rPr>
                 <a:t>730       876     1022    1168    1314     1461    1607     1753    1899    2045     2191    2337</a:t>
               </a:r>

</xml_diff>

<commit_message>
updated Figure 1.2 peak sun hours
</commit_message>
<xml_diff>
--- a/Figures/Chapter_01/drawings/Fig1.2_radiation_map.pptx
+++ b/Figures/Chapter_01/drawings/Fig1.2_radiation_map.pptx
@@ -261,7 +261,7 @@
           <a:p>
             <a:fld id="{A43F5C92-9D54-42E7-9213-216165AB5EEF}" type="datetimeFigureOut">
               <a:rPr lang="en-GB" smtClean="0"/>
-              <a:t>13/07/2022</a:t>
+              <a:t>30/03/2023</a:t>
             </a:fld>
             <a:endParaRPr lang="en-GB"/>
           </a:p>
@@ -461,7 +461,7 @@
           <a:p>
             <a:fld id="{A43F5C92-9D54-42E7-9213-216165AB5EEF}" type="datetimeFigureOut">
               <a:rPr lang="en-GB" smtClean="0"/>
-              <a:t>13/07/2022</a:t>
+              <a:t>30/03/2023</a:t>
             </a:fld>
             <a:endParaRPr lang="en-GB"/>
           </a:p>
@@ -671,7 +671,7 @@
           <a:p>
             <a:fld id="{A43F5C92-9D54-42E7-9213-216165AB5EEF}" type="datetimeFigureOut">
               <a:rPr lang="en-GB" smtClean="0"/>
-              <a:t>13/07/2022</a:t>
+              <a:t>30/03/2023</a:t>
             </a:fld>
             <a:endParaRPr lang="en-GB"/>
           </a:p>
@@ -871,7 +871,7 @@
           <a:p>
             <a:fld id="{A43F5C92-9D54-42E7-9213-216165AB5EEF}" type="datetimeFigureOut">
               <a:rPr lang="en-GB" smtClean="0"/>
-              <a:t>13/07/2022</a:t>
+              <a:t>30/03/2023</a:t>
             </a:fld>
             <a:endParaRPr lang="en-GB"/>
           </a:p>
@@ -1147,7 +1147,7 @@
           <a:p>
             <a:fld id="{A43F5C92-9D54-42E7-9213-216165AB5EEF}" type="datetimeFigureOut">
               <a:rPr lang="en-GB" smtClean="0"/>
-              <a:t>13/07/2022</a:t>
+              <a:t>30/03/2023</a:t>
             </a:fld>
             <a:endParaRPr lang="en-GB"/>
           </a:p>
@@ -1415,7 +1415,7 @@
           <a:p>
             <a:fld id="{A43F5C92-9D54-42E7-9213-216165AB5EEF}" type="datetimeFigureOut">
               <a:rPr lang="en-GB" smtClean="0"/>
-              <a:t>13/07/2022</a:t>
+              <a:t>30/03/2023</a:t>
             </a:fld>
             <a:endParaRPr lang="en-GB"/>
           </a:p>
@@ -1830,7 +1830,7 @@
           <a:p>
             <a:fld id="{A43F5C92-9D54-42E7-9213-216165AB5EEF}" type="datetimeFigureOut">
               <a:rPr lang="en-GB" smtClean="0"/>
-              <a:t>13/07/2022</a:t>
+              <a:t>30/03/2023</a:t>
             </a:fld>
             <a:endParaRPr lang="en-GB"/>
           </a:p>
@@ -1972,7 +1972,7 @@
           <a:p>
             <a:fld id="{A43F5C92-9D54-42E7-9213-216165AB5EEF}" type="datetimeFigureOut">
               <a:rPr lang="en-GB" smtClean="0"/>
-              <a:t>13/07/2022</a:t>
+              <a:t>30/03/2023</a:t>
             </a:fld>
             <a:endParaRPr lang="en-GB"/>
           </a:p>
@@ -2085,7 +2085,7 @@
           <a:p>
             <a:fld id="{A43F5C92-9D54-42E7-9213-216165AB5EEF}" type="datetimeFigureOut">
               <a:rPr lang="en-GB" smtClean="0"/>
-              <a:t>13/07/2022</a:t>
+              <a:t>30/03/2023</a:t>
             </a:fld>
             <a:endParaRPr lang="en-GB"/>
           </a:p>
@@ -2398,7 +2398,7 @@
           <a:p>
             <a:fld id="{A43F5C92-9D54-42E7-9213-216165AB5EEF}" type="datetimeFigureOut">
               <a:rPr lang="en-GB" smtClean="0"/>
-              <a:t>13/07/2022</a:t>
+              <a:t>30/03/2023</a:t>
             </a:fld>
             <a:endParaRPr lang="en-GB"/>
           </a:p>
@@ -2687,7 +2687,7 @@
           <a:p>
             <a:fld id="{A43F5C92-9D54-42E7-9213-216165AB5EEF}" type="datetimeFigureOut">
               <a:rPr lang="en-GB" smtClean="0"/>
-              <a:t>13/07/2022</a:t>
+              <a:t>30/03/2023</a:t>
             </a:fld>
             <a:endParaRPr lang="en-GB"/>
           </a:p>
@@ -2930,7 +2930,7 @@
           <a:p>
             <a:fld id="{A43F5C92-9D54-42E7-9213-216165AB5EEF}" type="datetimeFigureOut">
               <a:rPr lang="en-GB" smtClean="0"/>
-              <a:t>13/07/2022</a:t>
+              <a:t>30/03/2023</a:t>
             </a:fld>
             <a:endParaRPr lang="en-GB"/>
           </a:p>
@@ -3453,7 +3453,21 @@
                 <a:latin typeface="Arial" panose="020B0604020202020204" pitchFamily="34" charset="0"/>
                 <a:cs typeface="Arial" panose="020B0604020202020204" pitchFamily="34" charset="0"/>
               </a:rPr>
-              <a:t>Equivalent hours (kWh/kW):</a:t>
+              <a:t>Peak </a:t>
+            </a:r>
+            <a:r>
+              <a:rPr lang="en-GB" sz="1400">
+                <a:latin typeface="Arial" panose="020B0604020202020204" pitchFamily="34" charset="0"/>
+                <a:cs typeface="Arial" panose="020B0604020202020204" pitchFamily="34" charset="0"/>
+              </a:rPr>
+              <a:t>Sun Hours </a:t>
+            </a:r>
+            <a:r>
+              <a:rPr lang="en-GB" sz="1400" dirty="0">
+                <a:latin typeface="Arial" panose="020B0604020202020204" pitchFamily="34" charset="0"/>
+                <a:cs typeface="Arial" panose="020B0604020202020204" pitchFamily="34" charset="0"/>
+              </a:rPr>
+              <a:t>(kWh/kW):</a:t>
             </a:r>
           </a:p>
         </p:txBody>

</xml_diff>

<commit_message>
small changes in Figures chapter 1
</commit_message>
<xml_diff>
--- a/Figures/Chapter_01/drawings/Fig1.2_radiation_map.pptx
+++ b/Figures/Chapter_01/drawings/Fig1.2_radiation_map.pptx
@@ -261,7 +261,7 @@
           <a:p>
             <a:fld id="{A43F5C92-9D54-42E7-9213-216165AB5EEF}" type="datetimeFigureOut">
               <a:rPr lang="en-GB" smtClean="0"/>
-              <a:t>30/03/2023</a:t>
+              <a:t>03/08/2023</a:t>
             </a:fld>
             <a:endParaRPr lang="en-GB"/>
           </a:p>
@@ -461,7 +461,7 @@
           <a:p>
             <a:fld id="{A43F5C92-9D54-42E7-9213-216165AB5EEF}" type="datetimeFigureOut">
               <a:rPr lang="en-GB" smtClean="0"/>
-              <a:t>30/03/2023</a:t>
+              <a:t>03/08/2023</a:t>
             </a:fld>
             <a:endParaRPr lang="en-GB"/>
           </a:p>
@@ -671,7 +671,7 @@
           <a:p>
             <a:fld id="{A43F5C92-9D54-42E7-9213-216165AB5EEF}" type="datetimeFigureOut">
               <a:rPr lang="en-GB" smtClean="0"/>
-              <a:t>30/03/2023</a:t>
+              <a:t>03/08/2023</a:t>
             </a:fld>
             <a:endParaRPr lang="en-GB"/>
           </a:p>
@@ -871,7 +871,7 @@
           <a:p>
             <a:fld id="{A43F5C92-9D54-42E7-9213-216165AB5EEF}" type="datetimeFigureOut">
               <a:rPr lang="en-GB" smtClean="0"/>
-              <a:t>30/03/2023</a:t>
+              <a:t>03/08/2023</a:t>
             </a:fld>
             <a:endParaRPr lang="en-GB"/>
           </a:p>
@@ -1147,7 +1147,7 @@
           <a:p>
             <a:fld id="{A43F5C92-9D54-42E7-9213-216165AB5EEF}" type="datetimeFigureOut">
               <a:rPr lang="en-GB" smtClean="0"/>
-              <a:t>30/03/2023</a:t>
+              <a:t>03/08/2023</a:t>
             </a:fld>
             <a:endParaRPr lang="en-GB"/>
           </a:p>
@@ -1415,7 +1415,7 @@
           <a:p>
             <a:fld id="{A43F5C92-9D54-42E7-9213-216165AB5EEF}" type="datetimeFigureOut">
               <a:rPr lang="en-GB" smtClean="0"/>
-              <a:t>30/03/2023</a:t>
+              <a:t>03/08/2023</a:t>
             </a:fld>
             <a:endParaRPr lang="en-GB"/>
           </a:p>
@@ -1830,7 +1830,7 @@
           <a:p>
             <a:fld id="{A43F5C92-9D54-42E7-9213-216165AB5EEF}" type="datetimeFigureOut">
               <a:rPr lang="en-GB" smtClean="0"/>
-              <a:t>30/03/2023</a:t>
+              <a:t>03/08/2023</a:t>
             </a:fld>
             <a:endParaRPr lang="en-GB"/>
           </a:p>
@@ -1972,7 +1972,7 @@
           <a:p>
             <a:fld id="{A43F5C92-9D54-42E7-9213-216165AB5EEF}" type="datetimeFigureOut">
               <a:rPr lang="en-GB" smtClean="0"/>
-              <a:t>30/03/2023</a:t>
+              <a:t>03/08/2023</a:t>
             </a:fld>
             <a:endParaRPr lang="en-GB"/>
           </a:p>
@@ -2085,7 +2085,7 @@
           <a:p>
             <a:fld id="{A43F5C92-9D54-42E7-9213-216165AB5EEF}" type="datetimeFigureOut">
               <a:rPr lang="en-GB" smtClean="0"/>
-              <a:t>30/03/2023</a:t>
+              <a:t>03/08/2023</a:t>
             </a:fld>
             <a:endParaRPr lang="en-GB"/>
           </a:p>
@@ -2398,7 +2398,7 @@
           <a:p>
             <a:fld id="{A43F5C92-9D54-42E7-9213-216165AB5EEF}" type="datetimeFigureOut">
               <a:rPr lang="en-GB" smtClean="0"/>
-              <a:t>30/03/2023</a:t>
+              <a:t>03/08/2023</a:t>
             </a:fld>
             <a:endParaRPr lang="en-GB"/>
           </a:p>
@@ -2687,7 +2687,7 @@
           <a:p>
             <a:fld id="{A43F5C92-9D54-42E7-9213-216165AB5EEF}" type="datetimeFigureOut">
               <a:rPr lang="en-GB" smtClean="0"/>
-              <a:t>30/03/2023</a:t>
+              <a:t>03/08/2023</a:t>
             </a:fld>
             <a:endParaRPr lang="en-GB"/>
           </a:p>
@@ -2930,7 +2930,7 @@
           <a:p>
             <a:fld id="{A43F5C92-9D54-42E7-9213-216165AB5EEF}" type="datetimeFigureOut">
               <a:rPr lang="en-GB" smtClean="0"/>
-              <a:t>30/03/2023</a:t>
+              <a:t>03/08/2023</a:t>
             </a:fld>
             <a:endParaRPr lang="en-GB"/>
           </a:p>
@@ -3434,8 +3434,8 @@
         </p:nvSpPr>
         <p:spPr>
           <a:xfrm>
-            <a:off x="213751" y="3918162"/>
-            <a:ext cx="2713326" cy="307777"/>
+            <a:off x="761852" y="3903488"/>
+            <a:ext cx="1944796" cy="307777"/>
           </a:xfrm>
           <a:prstGeom prst="rect">
             <a:avLst/>
@@ -3448,26 +3448,13 @@
           </a:bodyPr>
           <a:lstStyle/>
           <a:p>
+            <a:pPr algn="r"/>
             <a:r>
               <a:rPr lang="en-GB" sz="1400" dirty="0">
                 <a:latin typeface="Arial" panose="020B0604020202020204" pitchFamily="34" charset="0"/>
                 <a:cs typeface="Arial" panose="020B0604020202020204" pitchFamily="34" charset="0"/>
               </a:rPr>
-              <a:t>Peak </a:t>
-            </a:r>
-            <a:r>
-              <a:rPr lang="en-GB" sz="1400">
-                <a:latin typeface="Arial" panose="020B0604020202020204" pitchFamily="34" charset="0"/>
-                <a:cs typeface="Arial" panose="020B0604020202020204" pitchFamily="34" charset="0"/>
-              </a:rPr>
-              <a:t>Sun Hours </a:t>
-            </a:r>
-            <a:r>
-              <a:rPr lang="en-GB" sz="1400" dirty="0">
-                <a:latin typeface="Arial" panose="020B0604020202020204" pitchFamily="34" charset="0"/>
-                <a:cs typeface="Arial" panose="020B0604020202020204" pitchFamily="34" charset="0"/>
-              </a:rPr>
-              <a:t>(kWh/kW):</a:t>
+              <a:t>Peak Sun Hours:</a:t>
             </a:r>
           </a:p>
         </p:txBody>

</xml_diff>

<commit_message>
increase quality figures chapter 1
</commit_message>
<xml_diff>
--- a/Figures/Chapter_01/drawings/Fig1.2_radiation_map.pptx
+++ b/Figures/Chapter_01/drawings/Fig1.2_radiation_map.pptx
@@ -261,7 +261,7 @@
           <a:p>
             <a:fld id="{A43F5C92-9D54-42E7-9213-216165AB5EEF}" type="datetimeFigureOut">
               <a:rPr lang="en-GB" smtClean="0"/>
-              <a:t>03/08/2023</a:t>
+              <a:t>31/08/2023</a:t>
             </a:fld>
             <a:endParaRPr lang="en-GB"/>
           </a:p>
@@ -461,7 +461,7 @@
           <a:p>
             <a:fld id="{A43F5C92-9D54-42E7-9213-216165AB5EEF}" type="datetimeFigureOut">
               <a:rPr lang="en-GB" smtClean="0"/>
-              <a:t>03/08/2023</a:t>
+              <a:t>31/08/2023</a:t>
             </a:fld>
             <a:endParaRPr lang="en-GB"/>
           </a:p>
@@ -671,7 +671,7 @@
           <a:p>
             <a:fld id="{A43F5C92-9D54-42E7-9213-216165AB5EEF}" type="datetimeFigureOut">
               <a:rPr lang="en-GB" smtClean="0"/>
-              <a:t>03/08/2023</a:t>
+              <a:t>31/08/2023</a:t>
             </a:fld>
             <a:endParaRPr lang="en-GB"/>
           </a:p>
@@ -871,7 +871,7 @@
           <a:p>
             <a:fld id="{A43F5C92-9D54-42E7-9213-216165AB5EEF}" type="datetimeFigureOut">
               <a:rPr lang="en-GB" smtClean="0"/>
-              <a:t>03/08/2023</a:t>
+              <a:t>31/08/2023</a:t>
             </a:fld>
             <a:endParaRPr lang="en-GB"/>
           </a:p>
@@ -1147,7 +1147,7 @@
           <a:p>
             <a:fld id="{A43F5C92-9D54-42E7-9213-216165AB5EEF}" type="datetimeFigureOut">
               <a:rPr lang="en-GB" smtClean="0"/>
-              <a:t>03/08/2023</a:t>
+              <a:t>31/08/2023</a:t>
             </a:fld>
             <a:endParaRPr lang="en-GB"/>
           </a:p>
@@ -1415,7 +1415,7 @@
           <a:p>
             <a:fld id="{A43F5C92-9D54-42E7-9213-216165AB5EEF}" type="datetimeFigureOut">
               <a:rPr lang="en-GB" smtClean="0"/>
-              <a:t>03/08/2023</a:t>
+              <a:t>31/08/2023</a:t>
             </a:fld>
             <a:endParaRPr lang="en-GB"/>
           </a:p>
@@ -1830,7 +1830,7 @@
           <a:p>
             <a:fld id="{A43F5C92-9D54-42E7-9213-216165AB5EEF}" type="datetimeFigureOut">
               <a:rPr lang="en-GB" smtClean="0"/>
-              <a:t>03/08/2023</a:t>
+              <a:t>31/08/2023</a:t>
             </a:fld>
             <a:endParaRPr lang="en-GB"/>
           </a:p>
@@ -1972,7 +1972,7 @@
           <a:p>
             <a:fld id="{A43F5C92-9D54-42E7-9213-216165AB5EEF}" type="datetimeFigureOut">
               <a:rPr lang="en-GB" smtClean="0"/>
-              <a:t>03/08/2023</a:t>
+              <a:t>31/08/2023</a:t>
             </a:fld>
             <a:endParaRPr lang="en-GB"/>
           </a:p>
@@ -2085,7 +2085,7 @@
           <a:p>
             <a:fld id="{A43F5C92-9D54-42E7-9213-216165AB5EEF}" type="datetimeFigureOut">
               <a:rPr lang="en-GB" smtClean="0"/>
-              <a:t>03/08/2023</a:t>
+              <a:t>31/08/2023</a:t>
             </a:fld>
             <a:endParaRPr lang="en-GB"/>
           </a:p>
@@ -2398,7 +2398,7 @@
           <a:p>
             <a:fld id="{A43F5C92-9D54-42E7-9213-216165AB5EEF}" type="datetimeFigureOut">
               <a:rPr lang="en-GB" smtClean="0"/>
-              <a:t>03/08/2023</a:t>
+              <a:t>31/08/2023</a:t>
             </a:fld>
             <a:endParaRPr lang="en-GB"/>
           </a:p>
@@ -2687,7 +2687,7 @@
           <a:p>
             <a:fld id="{A43F5C92-9D54-42E7-9213-216165AB5EEF}" type="datetimeFigureOut">
               <a:rPr lang="en-GB" smtClean="0"/>
-              <a:t>03/08/2023</a:t>
+              <a:t>31/08/2023</a:t>
             </a:fld>
             <a:endParaRPr lang="en-GB"/>
           </a:p>
@@ -2930,7 +2930,7 @@
           <a:p>
             <a:fld id="{A43F5C92-9D54-42E7-9213-216165AB5EEF}" type="datetimeFigureOut">
               <a:rPr lang="en-GB" smtClean="0"/>
-              <a:t>03/08/2023</a:t>
+              <a:t>31/08/2023</a:t>
             </a:fld>
             <a:endParaRPr lang="en-GB"/>
           </a:p>

</xml_diff>